<commit_message>
Updated course materials to use COMPLETE event
</commit_message>
<xml_diff>
--- a/Slides/DevelopingWithTheSmartPlayerAPI_13May2013.pptx
+++ b/Slides/DevelopingWithTheSmartPlayerAPI_13May2013.pptx
@@ -3719,7 +3719,7 @@
             <a:fld id="{DDC063FE-8627-9A42-970F-0BBEEB02B587}" type="datetimeFigureOut">
               <a:rPr lang="en-US" smtClean="0"/>
               <a:pPr/>
-              <a:t>5/6/13</a:t>
+              <a:t>7/10/13</a:t>
             </a:fld>
             <a:endParaRPr lang="en-US" dirty="0"/>
           </a:p>
@@ -16625,6 +16625,16 @@
               <a:defRPr/>
             </a:pPr>
             <a:r>
+              <a:rPr lang="en-US" sz="3200" kern="0" dirty="0" smtClean="0">
+                <a:solidFill>
+                  <a:schemeClr val="tx1"/>
+                </a:solidFill>
+                <a:latin typeface="Source Code Pro"/>
+                <a:cs typeface="Source Code Pro"/>
+              </a:rPr>
+              <a:t>}</a:t>
+            </a:r>
+            <a:r>
               <a:rPr lang="en-US" sz="3200" kern="0" dirty="0">
                 <a:solidFill>
                   <a:schemeClr val="tx1"/>
@@ -16632,7 +16642,7 @@
                 <a:latin typeface="Source Code Pro"/>
                 <a:cs typeface="Source Code Pro"/>
               </a:rPr>
-              <a:t>          },</a:t>
+              <a:t>,</a:t>
             </a:r>
           </a:p>
           <a:p>
@@ -16768,7 +16778,46 @@
                 <a:latin typeface="Source Code Pro"/>
                 <a:cs typeface="Source Code Pro"/>
               </a:rPr>
-              <a:t>);</a:t>
+              <a:t>)</a:t>
+            </a:r>
+            <a:r>
+              <a:rPr lang="en-US" sz="3200" kern="0" dirty="0" smtClean="0">
+                <a:solidFill>
+                  <a:schemeClr val="tx1"/>
+                </a:solidFill>
+                <a:latin typeface="Source Code Pro"/>
+                <a:cs typeface="Source Code Pro"/>
+              </a:rPr>
+              <a:t>;</a:t>
+            </a:r>
+          </a:p>
+          <a:p>
+            <a:pPr marL="480775" indent="-480775">
+              <a:spcBef>
+                <a:spcPts val="0"/>
+              </a:spcBef>
+              <a:buNone/>
+              <a:defRPr/>
+            </a:pPr>
+            <a:r>
+              <a:rPr lang="en-US" sz="3200" kern="0" dirty="0">
+                <a:solidFill>
+                  <a:schemeClr val="tx1"/>
+                </a:solidFill>
+                <a:latin typeface="Source Code Pro"/>
+                <a:cs typeface="Source Code Pro"/>
+              </a:rPr>
+              <a:t>	</a:t>
+            </a:r>
+            <a:r>
+              <a:rPr lang="en-US" sz="3200" kern="0" dirty="0" smtClean="0">
+                <a:solidFill>
+                  <a:schemeClr val="tx1"/>
+                </a:solidFill>
+                <a:latin typeface="Source Code Pro"/>
+                <a:cs typeface="Source Code Pro"/>
+              </a:rPr>
+              <a:t>…</a:t>
             </a:r>
             <a:endParaRPr lang="en-US" sz="3200" dirty="0">
               <a:latin typeface="Source Code Pro"/>

</xml_diff>